<commit_message>
file thuyết trình ver1.1
</commit_message>
<xml_diff>
--- a/CS112_Group2.pptx
+++ b/CS112_Group2.pptx
@@ -5,7 +5,7 @@
     <p:sldMasterId id="2147483708" r:id="rId1"/>
   </p:sldMasterIdLst>
   <p:notesMasterIdLst>
-    <p:notesMasterId r:id="rId19"/>
+    <p:notesMasterId r:id="rId20"/>
   </p:notesMasterIdLst>
   <p:sldIdLst>
     <p:sldId id="256" r:id="rId2"/>
@@ -22,9 +22,10 @@
     <p:sldId id="264" r:id="rId13"/>
     <p:sldId id="265" r:id="rId14"/>
     <p:sldId id="266" r:id="rId15"/>
-    <p:sldId id="260" r:id="rId16"/>
-    <p:sldId id="272" r:id="rId17"/>
-    <p:sldId id="274" r:id="rId18"/>
+    <p:sldId id="275" r:id="rId16"/>
+    <p:sldId id="260" r:id="rId17"/>
+    <p:sldId id="272" r:id="rId18"/>
+    <p:sldId id="274" r:id="rId19"/>
   </p:sldIdLst>
   <p:sldSz cx="9144000" cy="6858000" type="screen4x3"/>
   <p:notesSz cx="6858000" cy="9144000"/>
@@ -142,6 +143,7 @@
             <p14:sldId id="264"/>
             <p14:sldId id="265"/>
             <p14:sldId id="266"/>
+            <p14:sldId id="275"/>
             <p14:sldId id="260"/>
             <p14:sldId id="272"/>
             <p14:sldId id="274"/>
@@ -275,7 +277,7 @@
           <a:p>
             <a:fld id="{54E49A39-F842-424B-8FAA-05374F36CBAB}" type="datetimeFigureOut">
               <a:rPr lang="en-US" smtClean="0"/>
-              <a:t>3/22/2021</a:t>
+              <a:t>3/23/2021</a:t>
             </a:fld>
             <a:endParaRPr lang="en-US"/>
           </a:p>
@@ -1095,7 +1097,7 @@
           <a:p>
             <a:fld id="{06D6F86B-E3C3-428D-BE8E-77D791D87B59}" type="datetimeFigureOut">
               <a:rPr lang="en-US" smtClean="0"/>
-              <a:t>3/22/2021</a:t>
+              <a:t>3/23/2021</a:t>
             </a:fld>
             <a:endParaRPr lang="en-US"/>
           </a:p>
@@ -1283,7 +1285,7 @@
           <a:p>
             <a:fld id="{06D6F86B-E3C3-428D-BE8E-77D791D87B59}" type="datetimeFigureOut">
               <a:rPr lang="en-US" smtClean="0"/>
-              <a:t>3/22/2021</a:t>
+              <a:t>3/23/2021</a:t>
             </a:fld>
             <a:endParaRPr lang="en-US"/>
           </a:p>
@@ -1481,7 +1483,7 @@
           <a:p>
             <a:fld id="{06D6F86B-E3C3-428D-BE8E-77D791D87B59}" type="datetimeFigureOut">
               <a:rPr lang="en-US" smtClean="0"/>
-              <a:t>3/22/2021</a:t>
+              <a:t>3/23/2021</a:t>
             </a:fld>
             <a:endParaRPr lang="en-US"/>
           </a:p>
@@ -1669,7 +1671,7 @@
           <a:p>
             <a:fld id="{06D6F86B-E3C3-428D-BE8E-77D791D87B59}" type="datetimeFigureOut">
               <a:rPr lang="en-US" smtClean="0"/>
-              <a:t>3/22/2021</a:t>
+              <a:t>3/23/2021</a:t>
             </a:fld>
             <a:endParaRPr lang="en-US"/>
           </a:p>
@@ -1879,7 +1881,7 @@
           <a:p>
             <a:fld id="{06D6F86B-E3C3-428D-BE8E-77D791D87B59}" type="datetimeFigureOut">
               <a:rPr lang="en-US" smtClean="0"/>
-              <a:t>3/22/2021</a:t>
+              <a:t>3/23/2021</a:t>
             </a:fld>
             <a:endParaRPr lang="en-US"/>
           </a:p>
@@ -2185,7 +2187,7 @@
           <a:p>
             <a:fld id="{06D6F86B-E3C3-428D-BE8E-77D791D87B59}" type="datetimeFigureOut">
               <a:rPr lang="en-US" smtClean="0"/>
-              <a:t>3/22/2021</a:t>
+              <a:t>3/23/2021</a:t>
             </a:fld>
             <a:endParaRPr lang="en-US"/>
           </a:p>
@@ -2625,7 +2627,7 @@
           <a:p>
             <a:fld id="{06D6F86B-E3C3-428D-BE8E-77D791D87B59}" type="datetimeFigureOut">
               <a:rPr lang="en-US" smtClean="0"/>
-              <a:t>3/22/2021</a:t>
+              <a:t>3/23/2021</a:t>
             </a:fld>
             <a:endParaRPr lang="en-US"/>
           </a:p>
@@ -2761,7 +2763,7 @@
           <a:p>
             <a:fld id="{06D6F86B-E3C3-428D-BE8E-77D791D87B59}" type="datetimeFigureOut">
               <a:rPr lang="en-US" smtClean="0"/>
-              <a:t>3/22/2021</a:t>
+              <a:t>3/23/2021</a:t>
             </a:fld>
             <a:endParaRPr lang="en-US"/>
           </a:p>
@@ -2874,7 +2876,7 @@
           <a:p>
             <a:fld id="{06D6F86B-E3C3-428D-BE8E-77D791D87B59}" type="datetimeFigureOut">
               <a:rPr lang="en-US" smtClean="0"/>
-              <a:t>3/22/2021</a:t>
+              <a:t>3/23/2021</a:t>
             </a:fld>
             <a:endParaRPr lang="en-US"/>
           </a:p>
@@ -3169,7 +3171,7 @@
           <a:p>
             <a:fld id="{06D6F86B-E3C3-428D-BE8E-77D791D87B59}" type="datetimeFigureOut">
               <a:rPr lang="en-US" smtClean="0"/>
-              <a:t>3/22/2021</a:t>
+              <a:t>3/23/2021</a:t>
             </a:fld>
             <a:endParaRPr lang="en-US"/>
           </a:p>
@@ -3445,7 +3447,7 @@
           <a:p>
             <a:fld id="{06D6F86B-E3C3-428D-BE8E-77D791D87B59}" type="datetimeFigureOut">
               <a:rPr lang="en-US" smtClean="0"/>
-              <a:t>3/22/2021</a:t>
+              <a:t>3/23/2021</a:t>
             </a:fld>
             <a:endParaRPr lang="en-US"/>
           </a:p>
@@ -3732,7 +3734,7 @@
           <a:p>
             <a:fld id="{06D6F86B-E3C3-428D-BE8E-77D791D87B59}" type="datetimeFigureOut">
               <a:rPr lang="en-US" smtClean="0"/>
-              <a:t>3/22/2021</a:t>
+              <a:t>3/23/2021</a:t>
             </a:fld>
             <a:endParaRPr lang="en-US"/>
           </a:p>
@@ -7173,7 +7175,17 @@
                             <a:latin typeface="Cambria Math"/>
                             <a:ea typeface="Cambria Math" pitchFamily="18" charset="0"/>
                           </a:rPr>
-                          <m:t>=0</m:t>
+                          <m:t>=</m:t>
+                        </m:r>
+                        <m:r>
+                          <a:rPr lang="en-US" b="0" i="1" smtClean="0">
+                            <a:solidFill>
+                              <a:schemeClr val="tx1"/>
+                            </a:solidFill>
+                            <a:latin typeface="Cambria Math"/>
+                            <a:ea typeface="Cambria Math" pitchFamily="18" charset="0"/>
+                          </a:rPr>
+                          <m:t>0</m:t>
                         </m:r>
                       </m:sub>
                       <m:sup>
@@ -7195,7 +7207,17 @@
                             <a:latin typeface="Cambria Math"/>
                             <a:ea typeface="Cambria Math" pitchFamily="18" charset="0"/>
                           </a:rPr>
-                          <m:t>−1</m:t>
+                          <m:t>−</m:t>
+                        </m:r>
+                        <m:r>
+                          <a:rPr lang="en-US" b="0" i="1" smtClean="0">
+                            <a:solidFill>
+                              <a:schemeClr val="tx1"/>
+                            </a:solidFill>
+                            <a:latin typeface="Cambria Math"/>
+                            <a:ea typeface="Cambria Math" pitchFamily="18" charset="0"/>
+                          </a:rPr>
+                          <m:t>1</m:t>
                         </m:r>
                       </m:sup>
                       <m:e>
@@ -7386,7 +7408,17 @@
                                 <a:latin typeface="Cambria Math"/>
                                 <a:ea typeface="Cambria Math" pitchFamily="18" charset="0"/>
                               </a:rPr>
-                              <m:t>=0</m:t>
+                              <m:t>=</m:t>
+                            </m:r>
+                            <m:r>
+                              <a:rPr lang="en-US" i="1" dirty="0">
+                                <a:solidFill>
+                                  <a:schemeClr val="tx1"/>
+                                </a:solidFill>
+                                <a:latin typeface="Cambria Math"/>
+                                <a:ea typeface="Cambria Math" pitchFamily="18" charset="0"/>
+                              </a:rPr>
+                              <m:t>0</m:t>
                             </m:r>
                           </m:sub>
                           <m:sup>
@@ -7408,7 +7440,17 @@
                                 <a:latin typeface="Cambria Math"/>
                                 <a:ea typeface="Cambria Math" pitchFamily="18" charset="0"/>
                               </a:rPr>
-                              <m:t>−1</m:t>
+                              <m:t>−</m:t>
+                            </m:r>
+                            <m:r>
+                              <a:rPr lang="en-US" i="1" dirty="0">
+                                <a:solidFill>
+                                  <a:schemeClr val="tx1"/>
+                                </a:solidFill>
+                                <a:latin typeface="Cambria Math"/>
+                                <a:ea typeface="Cambria Math" pitchFamily="18" charset="0"/>
+                              </a:rPr>
+                              <m:t>1</m:t>
                             </m:r>
                           </m:sup>
                           <m:e>
@@ -7677,7 +7719,17 @@
                             <a:latin typeface="Cambria Math"/>
                             <a:ea typeface="Cambria Math" pitchFamily="18" charset="0"/>
                           </a:rPr>
-                          <m:t>=0</m:t>
+                          <m:t>=</m:t>
+                        </m:r>
+                        <m:r>
+                          <a:rPr lang="en-US" b="0" i="1" dirty="0" smtClean="0">
+                            <a:solidFill>
+                              <a:schemeClr val="tx1"/>
+                            </a:solidFill>
+                            <a:latin typeface="Cambria Math"/>
+                            <a:ea typeface="Cambria Math" pitchFamily="18" charset="0"/>
+                          </a:rPr>
+                          <m:t>0</m:t>
                         </m:r>
                       </m:sub>
                       <m:sup>
@@ -7699,7 +7751,17 @@
                             <a:latin typeface="Cambria Math"/>
                             <a:ea typeface="Cambria Math" pitchFamily="18" charset="0"/>
                           </a:rPr>
-                          <m:t>−1</m:t>
+                          <m:t>−</m:t>
+                        </m:r>
+                        <m:r>
+                          <a:rPr lang="en-US" b="0" i="1" dirty="0" smtClean="0">
+                            <a:solidFill>
+                              <a:schemeClr val="tx1"/>
+                            </a:solidFill>
+                            <a:latin typeface="Cambria Math"/>
+                            <a:ea typeface="Cambria Math" pitchFamily="18" charset="0"/>
+                          </a:rPr>
+                          <m:t>1</m:t>
                         </m:r>
                       </m:sup>
                       <m:e>
@@ -8048,7 +8110,17 @@
                             <a:latin typeface="Cambria Math"/>
                             <a:ea typeface="Cambria Math" pitchFamily="18" charset="0"/>
                           </a:rPr>
-                          <m:t>−1</m:t>
+                          <m:t>−</m:t>
+                        </m:r>
+                        <m:r>
+                          <a:rPr lang="en-US" b="0" i="1" smtClean="0">
+                            <a:solidFill>
+                              <a:schemeClr val="tx1"/>
+                            </a:solidFill>
+                            <a:latin typeface="Cambria Math"/>
+                            <a:ea typeface="Cambria Math" pitchFamily="18" charset="0"/>
+                          </a:rPr>
+                          <m:t>1</m:t>
                         </m:r>
                       </m:den>
                     </m:f>
@@ -10207,6 +10279,223 @@
       </p:grpSpPr>
       <p:sp>
         <p:nvSpPr>
+          <p:cNvPr id="2" name="Tiêu đề 1">
+            <a:extLst>
+              <a:ext uri="{FF2B5EF4-FFF2-40B4-BE49-F238E27FC236}">
+                <a16:creationId xmlns:a16="http://schemas.microsoft.com/office/drawing/2014/main" id="{CC760180-AB41-420A-91BB-2127920F83DB}"/>
+              </a:ext>
+            </a:extLst>
+          </p:cNvPr>
+          <p:cNvSpPr>
+            <a:spLocks noGrp="1"/>
+          </p:cNvSpPr>
+          <p:nvPr>
+            <p:ph type="title"/>
+          </p:nvPr>
+        </p:nvSpPr>
+        <p:spPr/>
+        <p:txBody>
+          <a:bodyPr/>
+          <a:lstStyle/>
+          <a:p>
+            <a:endParaRPr lang="en-US"/>
+          </a:p>
+        </p:txBody>
+      </p:sp>
+      <p:sp>
+        <p:nvSpPr>
+          <p:cNvPr id="3" name="Chỗ dành sẵn cho Nội dung 2">
+            <a:extLst>
+              <a:ext uri="{FF2B5EF4-FFF2-40B4-BE49-F238E27FC236}">
+                <a16:creationId xmlns:a16="http://schemas.microsoft.com/office/drawing/2014/main" id="{D11B6D7D-4BE5-463B-94B6-02FDC055DEB9}"/>
+              </a:ext>
+            </a:extLst>
+          </p:cNvPr>
+          <p:cNvSpPr>
+            <a:spLocks noGrp="1"/>
+          </p:cNvSpPr>
+          <p:nvPr>
+            <p:ph idx="1"/>
+          </p:nvPr>
+        </p:nvSpPr>
+        <p:spPr/>
+        <p:txBody>
+          <a:bodyPr/>
+          <a:lstStyle/>
+          <a:p>
+            <a:pPr marL="0" indent="0">
+              <a:buNone/>
+            </a:pPr>
+            <a:r>
+              <a:rPr lang="en-US" b="1" dirty="0">
+                <a:solidFill>
+                  <a:schemeClr val="tx1">
+                    <a:lumMod val="65000"/>
+                    <a:lumOff val="35000"/>
+                  </a:schemeClr>
+                </a:solidFill>
+                <a:latin typeface="Cambria Math" pitchFamily="18" charset="0"/>
+                <a:ea typeface="Cambria Math" pitchFamily="18" charset="0"/>
+              </a:rPr>
+              <a:t>Lời </a:t>
+            </a:r>
+            <a:r>
+              <a:rPr lang="en-US" b="1" dirty="0" err="1">
+                <a:solidFill>
+                  <a:schemeClr val="tx1">
+                    <a:lumMod val="65000"/>
+                    <a:lumOff val="35000"/>
+                  </a:schemeClr>
+                </a:solidFill>
+                <a:latin typeface="Cambria Math" pitchFamily="18" charset="0"/>
+                <a:ea typeface="Cambria Math" pitchFamily="18" charset="0"/>
+              </a:rPr>
+              <a:t>giải</a:t>
+            </a:r>
+            <a:r>
+              <a:rPr lang="en-US" b="1" dirty="0">
+                <a:solidFill>
+                  <a:schemeClr val="tx1">
+                    <a:lumMod val="65000"/>
+                    <a:lumOff val="35000"/>
+                  </a:schemeClr>
+                </a:solidFill>
+                <a:latin typeface="Cambria Math" pitchFamily="18" charset="0"/>
+                <a:ea typeface="Cambria Math" pitchFamily="18" charset="0"/>
+              </a:rPr>
+              <a:t> </a:t>
+            </a:r>
+            <a:r>
+              <a:rPr lang="en-US" b="1" dirty="0" err="1">
+                <a:solidFill>
+                  <a:schemeClr val="tx1">
+                    <a:lumMod val="65000"/>
+                    <a:lumOff val="35000"/>
+                  </a:schemeClr>
+                </a:solidFill>
+                <a:latin typeface="Cambria Math" pitchFamily="18" charset="0"/>
+                <a:ea typeface="Cambria Math" pitchFamily="18" charset="0"/>
+              </a:rPr>
+              <a:t>tổng</a:t>
+            </a:r>
+            <a:r>
+              <a:rPr lang="en-US" b="1" dirty="0">
+                <a:solidFill>
+                  <a:schemeClr val="tx1">
+                    <a:lumMod val="65000"/>
+                    <a:lumOff val="35000"/>
+                  </a:schemeClr>
+                </a:solidFill>
+                <a:latin typeface="Cambria Math" pitchFamily="18" charset="0"/>
+                <a:ea typeface="Cambria Math" pitchFamily="18" charset="0"/>
+              </a:rPr>
+              <a:t> </a:t>
+            </a:r>
+            <a:r>
+              <a:rPr lang="en-US" b="1" dirty="0" err="1">
+                <a:solidFill>
+                  <a:schemeClr val="tx1">
+                    <a:lumMod val="65000"/>
+                    <a:lumOff val="35000"/>
+                  </a:schemeClr>
+                </a:solidFill>
+                <a:latin typeface="Cambria Math" pitchFamily="18" charset="0"/>
+                <a:ea typeface="Cambria Math" pitchFamily="18" charset="0"/>
+              </a:rPr>
+              <a:t>quát</a:t>
+            </a:r>
+            <a:endParaRPr lang="en-US" b="1" dirty="0">
+              <a:solidFill>
+                <a:schemeClr val="tx1">
+                  <a:lumMod val="65000"/>
+                  <a:lumOff val="35000"/>
+                </a:schemeClr>
+              </a:solidFill>
+              <a:latin typeface="Cambria Math" pitchFamily="18" charset="0"/>
+              <a:ea typeface="Cambria Math" pitchFamily="18" charset="0"/>
+            </a:endParaRPr>
+          </a:p>
+          <a:p>
+            <a:r>
+              <a:rPr lang="en-US" sz="2800">
+                <a:solidFill>
+                  <a:srgbClr val="0070C0"/>
+                </a:solidFill>
+                <a:latin typeface="Cambria Math" pitchFamily="18" charset="0"/>
+                <a:ea typeface="Cambria Math" pitchFamily="18" charset="0"/>
+              </a:rPr>
+              <a:t>TH </a:t>
+            </a:r>
+            <a:r>
+              <a:rPr lang="vi-VN" sz="2800">
+                <a:solidFill>
+                  <a:srgbClr val="0070C0"/>
+                </a:solidFill>
+                <a:latin typeface="Cambria Math" pitchFamily="18" charset="0"/>
+                <a:ea typeface="Cambria Math" pitchFamily="18" charset="0"/>
+              </a:rPr>
+              <a:t>d(b) không phải hàm nhân?</a:t>
+            </a:r>
+          </a:p>
+          <a:p>
+            <a:pPr marL="0" indent="0">
+              <a:buNone/>
+            </a:pPr>
+            <a:r>
+              <a:rPr lang="vi-VN" sz="2800" b="1">
+                <a:solidFill>
+                  <a:srgbClr val="0070C0"/>
+                </a:solidFill>
+                <a:latin typeface="Cambria Math" pitchFamily="18" charset="0"/>
+                <a:ea typeface="Cambria Math" pitchFamily="18" charset="0"/>
+              </a:rPr>
+              <a:t>-&gt; Tính trực tiếp nghiệm riêng và nghiệm thuần nhất.</a:t>
+            </a:r>
+            <a:endParaRPr lang="en-US" b="1" dirty="0">
+              <a:solidFill>
+                <a:schemeClr val="tx1">
+                  <a:lumMod val="65000"/>
+                  <a:lumOff val="35000"/>
+                </a:schemeClr>
+              </a:solidFill>
+              <a:latin typeface="Cambria Math" pitchFamily="18" charset="0"/>
+              <a:ea typeface="Cambria Math" pitchFamily="18" charset="0"/>
+            </a:endParaRPr>
+          </a:p>
+        </p:txBody>
+      </p:sp>
+    </p:spTree>
+    <p:extLst>
+      <p:ext uri="{BB962C8B-B14F-4D97-AF65-F5344CB8AC3E}">
+        <p14:creationId xmlns:p14="http://schemas.microsoft.com/office/powerpoint/2010/main" val="3650831678"/>
+      </p:ext>
+    </p:extLst>
+  </p:cSld>
+  <p:clrMapOvr>
+    <a:masterClrMapping/>
+  </p:clrMapOvr>
+</p:sld>
+</file>
+
+<file path=ppt/slides/slide16.xml><?xml version="1.0" encoding="utf-8"?>
+<p:sld xmlns:a="http://schemas.openxmlformats.org/drawingml/2006/main" xmlns:r="http://schemas.openxmlformats.org/officeDocument/2006/relationships" xmlns:p="http://schemas.openxmlformats.org/presentationml/2006/main">
+  <p:cSld>
+    <p:spTree>
+      <p:nvGrpSpPr>
+        <p:cNvPr id="1" name=""/>
+        <p:cNvGrpSpPr/>
+        <p:nvPr/>
+      </p:nvGrpSpPr>
+      <p:grpSpPr>
+        <a:xfrm>
+          <a:off x="0" y="0"/>
+          <a:ext cx="0" cy="0"/>
+          <a:chOff x="0" y="0"/>
+          <a:chExt cx="0" cy="0"/>
+        </a:xfrm>
+      </p:grpSpPr>
+      <p:sp>
+        <p:nvSpPr>
           <p:cNvPr id="7" name="Title 6"/>
           <p:cNvSpPr>
             <a:spLocks noGrp="1"/>
@@ -10266,7 +10555,7 @@
 </p:sld>
 </file>
 
-<file path=ppt/slides/slide16.xml><?xml version="1.0" encoding="utf-8"?>
+<file path=ppt/slides/slide17.xml><?xml version="1.0" encoding="utf-8"?>
 <p:sld xmlns:a="http://schemas.openxmlformats.org/drawingml/2006/main" xmlns:r="http://schemas.openxmlformats.org/officeDocument/2006/relationships" xmlns:p="http://schemas.openxmlformats.org/presentationml/2006/main">
   <p:cSld>
     <p:spTree>
@@ -10328,7 +10617,7 @@
 </p:sld>
 </file>
 
-<file path=ppt/slides/slide17.xml><?xml version="1.0" encoding="utf-8"?>
+<file path=ppt/slides/slide18.xml><?xml version="1.0" encoding="utf-8"?>
 <p:sld xmlns:a="http://schemas.openxmlformats.org/drawingml/2006/main" xmlns:r="http://schemas.openxmlformats.org/officeDocument/2006/relationships" xmlns:p="http://schemas.openxmlformats.org/presentationml/2006/main">
   <p:cSld>
     <p:spTree>
@@ -10564,8 +10853,8 @@
           </a:p>
         </p:txBody>
       </p:sp>
-      <mc:AlternateContent xmlns:mc="http://schemas.openxmlformats.org/markup-compatibility/2006">
-        <mc:Choice xmlns:a14="http://schemas.microsoft.com/office/drawing/2010/main" Requires="a14">
+      <mc:AlternateContent xmlns:mc="http://schemas.openxmlformats.org/markup-compatibility/2006" xmlns:a14="http://schemas.microsoft.com/office/drawing/2010/main">
+        <mc:Choice Requires="a14">
           <p:sp>
             <p:nvSpPr>
               <p:cNvPr id="5" name="Content Placeholder 2">
@@ -11046,7 +11335,7 @@
             </p:txBody>
           </p:sp>
         </mc:Choice>
-        <mc:Fallback>
+        <mc:Fallback xmlns="">
           <p:sp>
             <p:nvSpPr>
               <p:cNvPr id="5" name="Content Placeholder 2">
@@ -12260,8 +12549,8 @@
           </a:p>
         </p:txBody>
       </p:sp>
-      <mc:AlternateContent xmlns:mc="http://schemas.openxmlformats.org/markup-compatibility/2006">
-        <mc:Choice xmlns:a14="http://schemas.microsoft.com/office/drawing/2010/main" Requires="a14">
+      <mc:AlternateContent xmlns:mc="http://schemas.openxmlformats.org/markup-compatibility/2006" xmlns:a14="http://schemas.microsoft.com/office/drawing/2010/main">
+        <mc:Choice Requires="a14">
           <p:sp>
             <p:nvSpPr>
               <p:cNvPr id="3" name="Content Placeholder 2"/>
@@ -12317,7 +12606,13 @@
                               <a:rPr lang="en-US" b="0" i="1" smtClean="0">
                                 <a:latin typeface="Cambria Math"/>
                               </a:rPr>
-                              <m:t>1 </m:t>
+                              <m:t>1</m:t>
+                            </m:r>
+                            <m:r>
+                              <a:rPr lang="en-US" b="0" i="1" smtClean="0">
+                                <a:latin typeface="Cambria Math"/>
+                              </a:rPr>
+                              <m:t> </m:t>
                             </m:r>
                             <m:r>
                               <a:rPr lang="en-US" b="0" i="1" smtClean="0">
@@ -12353,7 +12648,13 @@
                               <a:rPr lang="en-US" b="0" i="1" smtClean="0">
                                 <a:latin typeface="Cambria Math"/>
                               </a:rPr>
-                              <m:t>=0</m:t>
+                              <m:t>=</m:t>
+                            </m:r>
+                            <m:r>
+                              <a:rPr lang="en-US" b="0" i="1" smtClean="0">
+                                <a:latin typeface="Cambria Math"/>
+                              </a:rPr>
+                              <m:t>0</m:t>
                             </m:r>
                           </m:e>
                           <m:e>
@@ -12382,7 +12683,13 @@
                                   <a:rPr lang="en-US" b="0" i="1" smtClean="0">
                                     <a:latin typeface="Cambria Math"/>
                                   </a:rPr>
-                                  <m:t>−1</m:t>
+                                  <m:t>−</m:t>
+                                </m:r>
+                                <m:r>
+                                  <a:rPr lang="en-US" b="0" i="1" smtClean="0">
+                                    <a:latin typeface="Cambria Math"/>
+                                  </a:rPr>
+                                  <m:t>1</m:t>
                                 </m:r>
                               </m:e>
                             </m:d>
@@ -12407,7 +12714,7 @@
             </p:txBody>
           </p:sp>
         </mc:Choice>
-        <mc:Fallback>
+        <mc:Fallback xmlns="">
           <p:sp>
             <p:nvSpPr>
               <p:cNvPr id="3" name="Content Placeholder 2"/>
@@ -12504,8 +12811,8 @@
           </a:prstGeom>
         </p:spPr>
       </p:pic>
-      <mc:AlternateContent xmlns:mc="http://schemas.openxmlformats.org/markup-compatibility/2006">
-        <mc:Choice xmlns:a14="http://schemas.microsoft.com/office/drawing/2010/main" Requires="a14">
+      <mc:AlternateContent xmlns:mc="http://schemas.openxmlformats.org/markup-compatibility/2006" xmlns:a14="http://schemas.microsoft.com/office/drawing/2010/main">
+        <mc:Choice Requires="a14">
           <p:sp>
             <p:nvSpPr>
               <p:cNvPr id="6" name="Content Placeholder 2">
@@ -13467,7 +13774,7 @@
                           <m:e>
                             <m:r>
                               <a:rPr lang="en-US" sz="2000" b="1" i="1" kern="0" smtClean="0">
-                                <a:latin typeface="Cambria Math" pitchFamily="18" charset="0"/>
+                                <a:latin typeface="Cambria Math" panose="02040503050406030204" pitchFamily="18" charset="0"/>
                                 <a:ea typeface="Cambria Math" pitchFamily="18" charset="0"/>
                               </a:rPr>
                               <m:t>𝑻</m:t>
@@ -13646,7 +13953,7 @@
             </p:txBody>
           </p:sp>
         </mc:Choice>
-        <mc:Fallback>
+        <mc:Fallback xmlns="">
           <p:sp>
             <p:nvSpPr>
               <p:cNvPr id="6" name="Content Placeholder 2">
@@ -13851,8 +14158,8 @@
           </a:p>
         </p:txBody>
       </p:sp>
-      <mc:AlternateContent xmlns:mc="http://schemas.openxmlformats.org/markup-compatibility/2006">
-        <mc:Choice xmlns:a14="http://schemas.microsoft.com/office/drawing/2010/main" Requires="a14">
+      <mc:AlternateContent xmlns:mc="http://schemas.openxmlformats.org/markup-compatibility/2006" xmlns:a14="http://schemas.microsoft.com/office/drawing/2010/main">
+        <mc:Choice Requires="a14">
           <p:sp>
             <p:nvSpPr>
               <p:cNvPr id="3" name="Content Placeholder 2"/>
@@ -14114,7 +14421,7 @@
             </p:txBody>
           </p:sp>
         </mc:Choice>
-        <mc:Fallback>
+        <mc:Fallback xmlns="">
           <p:sp>
             <p:nvSpPr>
               <p:cNvPr id="3" name="Content Placeholder 2"/>

</xml_diff>